<commit_message>
Update the title image and improve the introduction section.
</commit_message>
<xml_diff>
--- a/others/DFIR_Recover_SourceCode/img/designDoc.pptx
+++ b/others/DFIR_Recover_SourceCode/img/designDoc.pptx
@@ -6,6 +6,7 @@
   </p:sldMasterIdLst>
   <p:sldIdLst>
     <p:sldId id="256" r:id="rId2"/>
+    <p:sldId id="257" r:id="rId3"/>
   </p:sldIdLst>
   <p:sldSz cx="12192000" cy="6858000"/>
   <p:notesSz cx="6858000" cy="9144000"/>
@@ -104,6 +105,11 @@
       </a:defRPr>
     </a:lvl9pPr>
   </p:defaultTextStyle>
+  <p:extLst>
+    <p:ext uri="{EFAFB233-063F-42B5-8137-9DF3F51BA10A}">
+      <p15:sldGuideLst xmlns:p15="http://schemas.microsoft.com/office/powerpoint/2012/main"/>
+    </p:ext>
+  </p:extLst>
 </p:presentation>
 </file>
 
@@ -256,7 +262,7 @@
           <a:p>
             <a:fld id="{F7002943-9188-41BC-85AD-B17F199A9790}" type="datetimeFigureOut">
               <a:rPr lang="en-SG" smtClean="0"/>
-              <a:t>10/4/2025</a:t>
+              <a:t>12/4/2025</a:t>
             </a:fld>
             <a:endParaRPr lang="en-SG"/>
           </a:p>
@@ -456,7 +462,7 @@
           <a:p>
             <a:fld id="{F7002943-9188-41BC-85AD-B17F199A9790}" type="datetimeFigureOut">
               <a:rPr lang="en-SG" smtClean="0"/>
-              <a:t>10/4/2025</a:t>
+              <a:t>12/4/2025</a:t>
             </a:fld>
             <a:endParaRPr lang="en-SG"/>
           </a:p>
@@ -666,7 +672,7 @@
           <a:p>
             <a:fld id="{F7002943-9188-41BC-85AD-B17F199A9790}" type="datetimeFigureOut">
               <a:rPr lang="en-SG" smtClean="0"/>
-              <a:t>10/4/2025</a:t>
+              <a:t>12/4/2025</a:t>
             </a:fld>
             <a:endParaRPr lang="en-SG"/>
           </a:p>
@@ -866,7 +872,7 @@
           <a:p>
             <a:fld id="{F7002943-9188-41BC-85AD-B17F199A9790}" type="datetimeFigureOut">
               <a:rPr lang="en-SG" smtClean="0"/>
-              <a:t>10/4/2025</a:t>
+              <a:t>12/4/2025</a:t>
             </a:fld>
             <a:endParaRPr lang="en-SG"/>
           </a:p>
@@ -1142,7 +1148,7 @@
           <a:p>
             <a:fld id="{F7002943-9188-41BC-85AD-B17F199A9790}" type="datetimeFigureOut">
               <a:rPr lang="en-SG" smtClean="0"/>
-              <a:t>10/4/2025</a:t>
+              <a:t>12/4/2025</a:t>
             </a:fld>
             <a:endParaRPr lang="en-SG"/>
           </a:p>
@@ -1410,7 +1416,7 @@
           <a:p>
             <a:fld id="{F7002943-9188-41BC-85AD-B17F199A9790}" type="datetimeFigureOut">
               <a:rPr lang="en-SG" smtClean="0"/>
-              <a:t>10/4/2025</a:t>
+              <a:t>12/4/2025</a:t>
             </a:fld>
             <a:endParaRPr lang="en-SG"/>
           </a:p>
@@ -1825,7 +1831,7 @@
           <a:p>
             <a:fld id="{F7002943-9188-41BC-85AD-B17F199A9790}" type="datetimeFigureOut">
               <a:rPr lang="en-SG" smtClean="0"/>
-              <a:t>10/4/2025</a:t>
+              <a:t>12/4/2025</a:t>
             </a:fld>
             <a:endParaRPr lang="en-SG"/>
           </a:p>
@@ -1967,7 +1973,7 @@
           <a:p>
             <a:fld id="{F7002943-9188-41BC-85AD-B17F199A9790}" type="datetimeFigureOut">
               <a:rPr lang="en-SG" smtClean="0"/>
-              <a:t>10/4/2025</a:t>
+              <a:t>12/4/2025</a:t>
             </a:fld>
             <a:endParaRPr lang="en-SG"/>
           </a:p>
@@ -2080,7 +2086,7 @@
           <a:p>
             <a:fld id="{F7002943-9188-41BC-85AD-B17F199A9790}" type="datetimeFigureOut">
               <a:rPr lang="en-SG" smtClean="0"/>
-              <a:t>10/4/2025</a:t>
+              <a:t>12/4/2025</a:t>
             </a:fld>
             <a:endParaRPr lang="en-SG"/>
           </a:p>
@@ -2393,7 +2399,7 @@
           <a:p>
             <a:fld id="{F7002943-9188-41BC-85AD-B17F199A9790}" type="datetimeFigureOut">
               <a:rPr lang="en-SG" smtClean="0"/>
-              <a:t>10/4/2025</a:t>
+              <a:t>12/4/2025</a:t>
             </a:fld>
             <a:endParaRPr lang="en-SG"/>
           </a:p>
@@ -2682,7 +2688,7 @@
           <a:p>
             <a:fld id="{F7002943-9188-41BC-85AD-B17F199A9790}" type="datetimeFigureOut">
               <a:rPr lang="en-SG" smtClean="0"/>
-              <a:t>10/4/2025</a:t>
+              <a:t>12/4/2025</a:t>
             </a:fld>
             <a:endParaRPr lang="en-SG"/>
           </a:p>
@@ -2925,7 +2931,7 @@
           <a:p>
             <a:fld id="{F7002943-9188-41BC-85AD-B17F199A9790}" type="datetimeFigureOut">
               <a:rPr lang="en-SG" smtClean="0"/>
-              <a:t>10/4/2025</a:t>
+              <a:t>12/4/2025</a:t>
             </a:fld>
             <a:endParaRPr lang="en-SG"/>
           </a:p>
@@ -5606,6 +5612,1959 @@
     <p:extLst>
       <p:ext uri="{BB962C8B-B14F-4D97-AF65-F5344CB8AC3E}">
         <p14:creationId xmlns:p14="http://schemas.microsoft.com/office/powerpoint/2010/main" val="3274516884"/>
+      </p:ext>
+    </p:extLst>
+  </p:cSld>
+  <p:clrMapOvr>
+    <a:masterClrMapping/>
+  </p:clrMapOvr>
+</p:sld>
+</file>
+
+<file path=ppt/slides/slide2.xml><?xml version="1.0" encoding="utf-8"?>
+<p:sld xmlns:a="http://schemas.openxmlformats.org/drawingml/2006/main" xmlns:r="http://schemas.openxmlformats.org/officeDocument/2006/relationships" xmlns:p="http://schemas.openxmlformats.org/presentationml/2006/main">
+  <p:cSld>
+    <p:spTree>
+      <p:nvGrpSpPr>
+        <p:cNvPr id="1" name=""/>
+        <p:cNvGrpSpPr/>
+        <p:nvPr/>
+      </p:nvGrpSpPr>
+      <p:grpSpPr>
+        <a:xfrm>
+          <a:off x="0" y="0"/>
+          <a:ext cx="0" cy="0"/>
+          <a:chOff x="0" y="0"/>
+          <a:chExt cx="0" cy="0"/>
+        </a:xfrm>
+      </p:grpSpPr>
+      <p:pic>
+        <p:nvPicPr>
+          <p:cNvPr id="1026" name="Picture 2">
+            <a:extLst>
+              <a:ext uri="{FF2B5EF4-FFF2-40B4-BE49-F238E27FC236}">
+                <a16:creationId xmlns:a16="http://schemas.microsoft.com/office/drawing/2014/main" id="{3CDDD3B6-D536-7122-A64A-68BB4D37402C}"/>
+              </a:ext>
+            </a:extLst>
+          </p:cNvPr>
+          <p:cNvPicPr>
+            <a:picLocks noChangeAspect="1" noChangeArrowheads="1"/>
+          </p:cNvPicPr>
+          <p:nvPr/>
+        </p:nvPicPr>
+        <p:blipFill>
+          <a:blip r:embed="rId2">
+            <a:extLst>
+              <a:ext uri="{28A0092B-C50C-407E-A947-70E740481C1C}">
+                <a14:useLocalDpi xmlns:a14="http://schemas.microsoft.com/office/drawing/2010/main" val="0"/>
+              </a:ext>
+            </a:extLst>
+          </a:blip>
+          <a:srcRect/>
+          <a:stretch>
+            <a:fillRect/>
+          </a:stretch>
+        </p:blipFill>
+        <p:spPr bwMode="auto">
+          <a:xfrm>
+            <a:off x="1762544" y="2047642"/>
+            <a:ext cx="989958" cy="989958"/>
+          </a:xfrm>
+          <a:prstGeom prst="rect">
+            <a:avLst/>
+          </a:prstGeom>
+          <a:noFill/>
+          <a:extLst>
+            <a:ext uri="{909E8E84-426E-40DD-AFC4-6F175D3DCCD1}">
+              <a14:hiddenFill xmlns:a14="http://schemas.microsoft.com/office/drawing/2010/main">
+                <a:solidFill>
+                  <a:srgbClr val="FFFFFF"/>
+                </a:solidFill>
+              </a14:hiddenFill>
+            </a:ext>
+          </a:extLst>
+        </p:spPr>
+      </p:pic>
+      <p:sp>
+        <p:nvSpPr>
+          <p:cNvPr id="5" name="Arrow: Right 4">
+            <a:extLst>
+              <a:ext uri="{FF2B5EF4-FFF2-40B4-BE49-F238E27FC236}">
+                <a16:creationId xmlns:a16="http://schemas.microsoft.com/office/drawing/2014/main" id="{AF9B3B60-2173-F68F-212B-547F0464AD85}"/>
+              </a:ext>
+            </a:extLst>
+          </p:cNvPr>
+          <p:cNvSpPr/>
+          <p:nvPr/>
+        </p:nvSpPr>
+        <p:spPr>
+          <a:xfrm>
+            <a:off x="2771753" y="2465619"/>
+            <a:ext cx="365760" cy="154004"/>
+          </a:xfrm>
+          <a:prstGeom prst="rightArrow">
+            <a:avLst/>
+          </a:prstGeom>
+          <a:solidFill>
+            <a:srgbClr val="C00000"/>
+          </a:solidFill>
+        </p:spPr>
+        <p:style>
+          <a:lnRef idx="2">
+            <a:schemeClr val="accent1">
+              <a:shade val="15000"/>
+            </a:schemeClr>
+          </a:lnRef>
+          <a:fillRef idx="1">
+            <a:schemeClr val="accent1"/>
+          </a:fillRef>
+          <a:effectRef idx="0">
+            <a:schemeClr val="accent1"/>
+          </a:effectRef>
+          <a:fontRef idx="minor">
+            <a:schemeClr val="lt1"/>
+          </a:fontRef>
+        </p:style>
+        <p:txBody>
+          <a:bodyPr rtlCol="0" anchor="ctr"/>
+          <a:lstStyle/>
+          <a:p>
+            <a:pPr algn="ctr"/>
+            <a:endParaRPr lang="en-SG"/>
+          </a:p>
+        </p:txBody>
+      </p:sp>
+      <p:sp>
+        <p:nvSpPr>
+          <p:cNvPr id="6" name="Rectangle: Rounded Corners 5">
+            <a:extLst>
+              <a:ext uri="{FF2B5EF4-FFF2-40B4-BE49-F238E27FC236}">
+                <a16:creationId xmlns:a16="http://schemas.microsoft.com/office/drawing/2014/main" id="{4DBCBC0E-B526-84E8-6BEE-AD373B994820}"/>
+              </a:ext>
+            </a:extLst>
+          </p:cNvPr>
+          <p:cNvSpPr/>
+          <p:nvPr/>
+        </p:nvSpPr>
+        <p:spPr>
+          <a:xfrm>
+            <a:off x="3253867" y="2312857"/>
+            <a:ext cx="1144955" cy="520647"/>
+          </a:xfrm>
+          <a:prstGeom prst="roundRect">
+            <a:avLst/>
+          </a:prstGeom>
+          <a:solidFill>
+            <a:srgbClr val="C00000"/>
+          </a:solidFill>
+        </p:spPr>
+        <p:style>
+          <a:lnRef idx="2">
+            <a:schemeClr val="accent1">
+              <a:shade val="15000"/>
+            </a:schemeClr>
+          </a:lnRef>
+          <a:fillRef idx="1">
+            <a:schemeClr val="accent1"/>
+          </a:fillRef>
+          <a:effectRef idx="0">
+            <a:schemeClr val="accent1"/>
+          </a:effectRef>
+          <a:fontRef idx="minor">
+            <a:schemeClr val="lt1"/>
+          </a:fontRef>
+        </p:style>
+        <p:txBody>
+          <a:bodyPr rtlCol="0" anchor="ctr"/>
+          <a:lstStyle/>
+          <a:p>
+            <a:pPr algn="ctr"/>
+            <a:r>
+              <a:rPr lang="en-US" sz="1400" b="1" dirty="0" err="1">
+                <a:solidFill>
+                  <a:schemeClr val="bg1"/>
+                </a:solidFill>
+              </a:rPr>
+              <a:t>PyInstaller</a:t>
+            </a:r>
+            <a:endParaRPr lang="en-SG" sz="1400" b="1" dirty="0">
+              <a:solidFill>
+                <a:schemeClr val="bg1"/>
+              </a:solidFill>
+            </a:endParaRPr>
+          </a:p>
+        </p:txBody>
+      </p:sp>
+      <p:pic>
+        <p:nvPicPr>
+          <p:cNvPr id="8" name="Picture 7">
+            <a:extLst>
+              <a:ext uri="{FF2B5EF4-FFF2-40B4-BE49-F238E27FC236}">
+                <a16:creationId xmlns:a16="http://schemas.microsoft.com/office/drawing/2014/main" id="{89AD8F3A-A1B1-6EE3-B5DF-FC8707805925}"/>
+              </a:ext>
+            </a:extLst>
+          </p:cNvPr>
+          <p:cNvPicPr>
+            <a:picLocks noChangeAspect="1"/>
+          </p:cNvPicPr>
+          <p:nvPr/>
+        </p:nvPicPr>
+        <p:blipFill>
+          <a:blip r:embed="rId3"/>
+          <a:stretch>
+            <a:fillRect/>
+          </a:stretch>
+        </p:blipFill>
+        <p:spPr>
+          <a:xfrm>
+            <a:off x="4900187" y="2071351"/>
+            <a:ext cx="973888" cy="1003658"/>
+          </a:xfrm>
+          <a:prstGeom prst="rect">
+            <a:avLst/>
+          </a:prstGeom>
+        </p:spPr>
+      </p:pic>
+      <p:sp>
+        <p:nvSpPr>
+          <p:cNvPr id="9" name="Arrow: Right 8">
+            <a:extLst>
+              <a:ext uri="{FF2B5EF4-FFF2-40B4-BE49-F238E27FC236}">
+                <a16:creationId xmlns:a16="http://schemas.microsoft.com/office/drawing/2014/main" id="{6C0AED80-1DC4-4301-9F68-BC21A939B2DA}"/>
+              </a:ext>
+            </a:extLst>
+          </p:cNvPr>
+          <p:cNvSpPr/>
+          <p:nvPr/>
+        </p:nvSpPr>
+        <p:spPr>
+          <a:xfrm>
+            <a:off x="4489270" y="2457037"/>
+            <a:ext cx="365760" cy="154004"/>
+          </a:xfrm>
+          <a:prstGeom prst="rightArrow">
+            <a:avLst/>
+          </a:prstGeom>
+          <a:solidFill>
+            <a:srgbClr val="C00000"/>
+          </a:solidFill>
+        </p:spPr>
+        <p:style>
+          <a:lnRef idx="2">
+            <a:schemeClr val="accent1">
+              <a:shade val="15000"/>
+            </a:schemeClr>
+          </a:lnRef>
+          <a:fillRef idx="1">
+            <a:schemeClr val="accent1"/>
+          </a:fillRef>
+          <a:effectRef idx="0">
+            <a:schemeClr val="accent1"/>
+          </a:effectRef>
+          <a:fontRef idx="minor">
+            <a:schemeClr val="lt1"/>
+          </a:fontRef>
+        </p:style>
+        <p:txBody>
+          <a:bodyPr rtlCol="0" anchor="ctr"/>
+          <a:lstStyle/>
+          <a:p>
+            <a:pPr algn="ctr"/>
+            <a:endParaRPr lang="en-SG"/>
+          </a:p>
+        </p:txBody>
+      </p:sp>
+      <p:pic>
+        <p:nvPicPr>
+          <p:cNvPr id="10" name="Picture 9" descr="A red bomb with a star&#10;&#10;Description automatically generated">
+            <a:extLst>
+              <a:ext uri="{FF2B5EF4-FFF2-40B4-BE49-F238E27FC236}">
+                <a16:creationId xmlns:a16="http://schemas.microsoft.com/office/drawing/2014/main" id="{F3DB0A44-AA6E-F69C-A74F-7AAEE844C536}"/>
+              </a:ext>
+            </a:extLst>
+          </p:cNvPr>
+          <p:cNvPicPr>
+            <a:picLocks noChangeAspect="1"/>
+          </p:cNvPicPr>
+          <p:nvPr/>
+        </p:nvPicPr>
+        <p:blipFill>
+          <a:blip r:embed="rId4">
+            <a:extLst>
+              <a:ext uri="{28A0092B-C50C-407E-A947-70E740481C1C}">
+                <a14:useLocalDpi xmlns:a14="http://schemas.microsoft.com/office/drawing/2010/main" val="0"/>
+              </a:ext>
+            </a:extLst>
+          </a:blip>
+          <a:stretch>
+            <a:fillRect/>
+          </a:stretch>
+        </p:blipFill>
+        <p:spPr>
+          <a:xfrm flipH="1">
+            <a:off x="5430964" y="2583258"/>
+            <a:ext cx="560302" cy="454342"/>
+          </a:xfrm>
+          <a:prstGeom prst="rect">
+            <a:avLst/>
+          </a:prstGeom>
+        </p:spPr>
+      </p:pic>
+      <p:sp>
+        <p:nvSpPr>
+          <p:cNvPr id="11" name="TextBox 10">
+            <a:extLst>
+              <a:ext uri="{FF2B5EF4-FFF2-40B4-BE49-F238E27FC236}">
+                <a16:creationId xmlns:a16="http://schemas.microsoft.com/office/drawing/2014/main" id="{EA5B5446-023B-5C2A-7C87-0593157B98F6}"/>
+              </a:ext>
+            </a:extLst>
+          </p:cNvPr>
+          <p:cNvSpPr txBox="1"/>
+          <p:nvPr/>
+        </p:nvSpPr>
+        <p:spPr>
+          <a:xfrm>
+            <a:off x="1792440" y="1548131"/>
+            <a:ext cx="1433995" cy="523220"/>
+          </a:xfrm>
+          <a:prstGeom prst="rect">
+            <a:avLst/>
+          </a:prstGeom>
+          <a:noFill/>
+        </p:spPr>
+        <p:txBody>
+          <a:bodyPr wrap="square" rtlCol="0">
+            <a:spAutoFit/>
+          </a:bodyPr>
+          <a:lstStyle/>
+          <a:p>
+            <a:r>
+              <a:rPr lang="en-US" sz="1400" b="1" dirty="0">
+                <a:solidFill>
+                  <a:srgbClr val="000000"/>
+                </a:solidFill>
+                <a:latin typeface="neue-haas-grotesk-display"/>
+              </a:rPr>
+              <a:t>Backdoor Trojan Python Code </a:t>
+            </a:r>
+            <a:endParaRPr lang="en-SG" sz="1400" b="1" dirty="0"/>
+          </a:p>
+        </p:txBody>
+      </p:sp>
+      <p:sp>
+        <p:nvSpPr>
+          <p:cNvPr id="12" name="TextBox 11">
+            <a:extLst>
+              <a:ext uri="{FF2B5EF4-FFF2-40B4-BE49-F238E27FC236}">
+                <a16:creationId xmlns:a16="http://schemas.microsoft.com/office/drawing/2014/main" id="{6528FC02-EE1E-8567-8CD1-94A2DD42EC07}"/>
+              </a:ext>
+            </a:extLst>
+          </p:cNvPr>
+          <p:cNvSpPr txBox="1"/>
+          <p:nvPr/>
+        </p:nvSpPr>
+        <p:spPr>
+          <a:xfrm>
+            <a:off x="4672150" y="1548131"/>
+            <a:ext cx="1802065" cy="523220"/>
+          </a:xfrm>
+          <a:prstGeom prst="rect">
+            <a:avLst/>
+          </a:prstGeom>
+          <a:noFill/>
+        </p:spPr>
+        <p:txBody>
+          <a:bodyPr wrap="square" rtlCol="0">
+            <a:spAutoFit/>
+          </a:bodyPr>
+          <a:lstStyle/>
+          <a:p>
+            <a:r>
+              <a:rPr lang="en-US" sz="1400" b="1" dirty="0"/>
+              <a:t>False Software Installation exe file </a:t>
+            </a:r>
+            <a:endParaRPr lang="en-SG" sz="1400" b="1" dirty="0"/>
+          </a:p>
+        </p:txBody>
+      </p:sp>
+      <p:sp>
+        <p:nvSpPr>
+          <p:cNvPr id="13" name="Arrow: Right 12">
+            <a:extLst>
+              <a:ext uri="{FF2B5EF4-FFF2-40B4-BE49-F238E27FC236}">
+                <a16:creationId xmlns:a16="http://schemas.microsoft.com/office/drawing/2014/main" id="{40F3043E-7D03-CC1F-1DBE-0F4F47D86D8A}"/>
+              </a:ext>
+            </a:extLst>
+          </p:cNvPr>
+          <p:cNvSpPr/>
+          <p:nvPr/>
+        </p:nvSpPr>
+        <p:spPr>
+          <a:xfrm rot="5400000">
+            <a:off x="5129483" y="3262831"/>
+            <a:ext cx="365760" cy="154004"/>
+          </a:xfrm>
+          <a:prstGeom prst="rightArrow">
+            <a:avLst/>
+          </a:prstGeom>
+          <a:solidFill>
+            <a:srgbClr val="C00000"/>
+          </a:solidFill>
+        </p:spPr>
+        <p:style>
+          <a:lnRef idx="2">
+            <a:schemeClr val="accent1">
+              <a:shade val="15000"/>
+            </a:schemeClr>
+          </a:lnRef>
+          <a:fillRef idx="1">
+            <a:schemeClr val="accent1"/>
+          </a:fillRef>
+          <a:effectRef idx="0">
+            <a:schemeClr val="accent1"/>
+          </a:effectRef>
+          <a:fontRef idx="minor">
+            <a:schemeClr val="lt1"/>
+          </a:fontRef>
+        </p:style>
+        <p:txBody>
+          <a:bodyPr rtlCol="0" anchor="ctr"/>
+          <a:lstStyle/>
+          <a:p>
+            <a:pPr algn="ctr"/>
+            <a:endParaRPr lang="en-SG"/>
+          </a:p>
+        </p:txBody>
+      </p:sp>
+      <p:pic>
+        <p:nvPicPr>
+          <p:cNvPr id="1028" name="Picture 4" descr="Malware - Free computer icons">
+            <a:extLst>
+              <a:ext uri="{FF2B5EF4-FFF2-40B4-BE49-F238E27FC236}">
+                <a16:creationId xmlns:a16="http://schemas.microsoft.com/office/drawing/2014/main" id="{AB9231D2-0E9C-89F9-116A-301642D91C20}"/>
+              </a:ext>
+            </a:extLst>
+          </p:cNvPr>
+          <p:cNvPicPr>
+            <a:picLocks noChangeAspect="1" noChangeArrowheads="1"/>
+          </p:cNvPicPr>
+          <p:nvPr/>
+        </p:nvPicPr>
+        <p:blipFill>
+          <a:blip r:embed="rId5">
+            <a:extLst>
+              <a:ext uri="{28A0092B-C50C-407E-A947-70E740481C1C}">
+                <a14:useLocalDpi xmlns:a14="http://schemas.microsoft.com/office/drawing/2010/main" val="0"/>
+              </a:ext>
+            </a:extLst>
+          </a:blip>
+          <a:srcRect/>
+          <a:stretch>
+            <a:fillRect/>
+          </a:stretch>
+        </p:blipFill>
+        <p:spPr bwMode="auto">
+          <a:xfrm>
+            <a:off x="3725908" y="3460695"/>
+            <a:ext cx="1917735" cy="1917735"/>
+          </a:xfrm>
+          <a:prstGeom prst="rect">
+            <a:avLst/>
+          </a:prstGeom>
+          <a:noFill/>
+          <a:extLst>
+            <a:ext uri="{909E8E84-426E-40DD-AFC4-6F175D3DCCD1}">
+              <a14:hiddenFill xmlns:a14="http://schemas.microsoft.com/office/drawing/2010/main">
+                <a:solidFill>
+                  <a:srgbClr val="FFFFFF"/>
+                </a:solidFill>
+              </a14:hiddenFill>
+            </a:ext>
+          </a:extLst>
+        </p:spPr>
+      </p:pic>
+      <p:sp>
+        <p:nvSpPr>
+          <p:cNvPr id="14" name="TextBox 13">
+            <a:extLst>
+              <a:ext uri="{FF2B5EF4-FFF2-40B4-BE49-F238E27FC236}">
+                <a16:creationId xmlns:a16="http://schemas.microsoft.com/office/drawing/2014/main" id="{CC6491D3-B0EC-C834-4D33-AE7F495A3930}"/>
+              </a:ext>
+            </a:extLst>
+          </p:cNvPr>
+          <p:cNvSpPr txBox="1"/>
+          <p:nvPr/>
+        </p:nvSpPr>
+        <p:spPr>
+          <a:xfrm>
+            <a:off x="3137513" y="3562296"/>
+            <a:ext cx="1433995" cy="954107"/>
+          </a:xfrm>
+          <a:prstGeom prst="rect">
+            <a:avLst/>
+          </a:prstGeom>
+          <a:noFill/>
+        </p:spPr>
+        <p:txBody>
+          <a:bodyPr wrap="square" rtlCol="0">
+            <a:spAutoFit/>
+          </a:bodyPr>
+          <a:lstStyle/>
+          <a:p>
+            <a:r>
+              <a:rPr lang="en-US" sz="1400" b="1" dirty="0">
+                <a:solidFill>
+                  <a:srgbClr val="C00000"/>
+                </a:solidFill>
+              </a:rPr>
+              <a:t>Malware Execution On Victim Machine </a:t>
+            </a:r>
+            <a:endParaRPr lang="en-SG" sz="1400" b="1" dirty="0">
+              <a:solidFill>
+                <a:srgbClr val="C00000"/>
+              </a:solidFill>
+            </a:endParaRPr>
+          </a:p>
+        </p:txBody>
+      </p:sp>
+      <p:sp>
+        <p:nvSpPr>
+          <p:cNvPr id="15" name="Arrow: Right 14">
+            <a:extLst>
+              <a:ext uri="{FF2B5EF4-FFF2-40B4-BE49-F238E27FC236}">
+                <a16:creationId xmlns:a16="http://schemas.microsoft.com/office/drawing/2014/main" id="{2A130F74-BB66-5A2C-0788-58EDEDB742E7}"/>
+              </a:ext>
+            </a:extLst>
+          </p:cNvPr>
+          <p:cNvSpPr/>
+          <p:nvPr/>
+        </p:nvSpPr>
+        <p:spPr>
+          <a:xfrm>
+            <a:off x="5691195" y="4192761"/>
+            <a:ext cx="365760" cy="154004"/>
+          </a:xfrm>
+          <a:prstGeom prst="rightArrow">
+            <a:avLst/>
+          </a:prstGeom>
+        </p:spPr>
+        <p:style>
+          <a:lnRef idx="2">
+            <a:schemeClr val="accent6">
+              <a:shade val="15000"/>
+            </a:schemeClr>
+          </a:lnRef>
+          <a:fillRef idx="1">
+            <a:schemeClr val="accent6"/>
+          </a:fillRef>
+          <a:effectRef idx="0">
+            <a:schemeClr val="accent6"/>
+          </a:effectRef>
+          <a:fontRef idx="minor">
+            <a:schemeClr val="lt1"/>
+          </a:fontRef>
+        </p:style>
+        <p:txBody>
+          <a:bodyPr rtlCol="0" anchor="ctr"/>
+          <a:lstStyle/>
+          <a:p>
+            <a:pPr algn="ctr"/>
+            <a:endParaRPr lang="en-SG"/>
+          </a:p>
+        </p:txBody>
+      </p:sp>
+      <p:pic>
+        <p:nvPicPr>
+          <p:cNvPr id="20" name="Picture 19">
+            <a:extLst>
+              <a:ext uri="{FF2B5EF4-FFF2-40B4-BE49-F238E27FC236}">
+                <a16:creationId xmlns:a16="http://schemas.microsoft.com/office/drawing/2014/main" id="{AC8B8018-B00D-3ED9-C1F7-540382CDA711}"/>
+              </a:ext>
+            </a:extLst>
+          </p:cNvPr>
+          <p:cNvPicPr>
+            <a:picLocks noChangeAspect="1"/>
+          </p:cNvPicPr>
+          <p:nvPr/>
+        </p:nvPicPr>
+        <p:blipFill>
+          <a:blip r:embed="rId6"/>
+          <a:stretch>
+            <a:fillRect/>
+          </a:stretch>
+        </p:blipFill>
+        <p:spPr>
+          <a:xfrm>
+            <a:off x="6178296" y="3657600"/>
+            <a:ext cx="2117687" cy="1070322"/>
+          </a:xfrm>
+          <a:prstGeom prst="rect">
+            <a:avLst/>
+          </a:prstGeom>
+          <a:ln w="19050">
+            <a:solidFill>
+              <a:schemeClr val="tx1"/>
+            </a:solidFill>
+          </a:ln>
+        </p:spPr>
+      </p:pic>
+      <p:sp>
+        <p:nvSpPr>
+          <p:cNvPr id="21" name="TextBox 20">
+            <a:extLst>
+              <a:ext uri="{FF2B5EF4-FFF2-40B4-BE49-F238E27FC236}">
+                <a16:creationId xmlns:a16="http://schemas.microsoft.com/office/drawing/2014/main" id="{41191B5B-5719-C726-A177-4ABC7C1C69AD}"/>
+              </a:ext>
+            </a:extLst>
+          </p:cNvPr>
+          <p:cNvSpPr txBox="1"/>
+          <p:nvPr/>
+        </p:nvSpPr>
+        <p:spPr>
+          <a:xfrm>
+            <a:off x="6083192" y="4727922"/>
+            <a:ext cx="2307894" cy="523220"/>
+          </a:xfrm>
+          <a:prstGeom prst="rect">
+            <a:avLst/>
+          </a:prstGeom>
+          <a:noFill/>
+        </p:spPr>
+        <p:txBody>
+          <a:bodyPr wrap="square" rtlCol="0">
+            <a:spAutoFit/>
+          </a:bodyPr>
+          <a:lstStyle/>
+          <a:p>
+            <a:r>
+              <a:rPr lang="en-US" sz="1400" b="1" dirty="0"/>
+              <a:t>System Error Memory Dump Collection</a:t>
+            </a:r>
+            <a:endParaRPr lang="en-SG" sz="1400" b="1" dirty="0"/>
+          </a:p>
+        </p:txBody>
+      </p:sp>
+      <p:pic>
+        <p:nvPicPr>
+          <p:cNvPr id="1030" name="Picture 6" descr="Data processing - Free seo and web icons">
+            <a:extLst>
+              <a:ext uri="{FF2B5EF4-FFF2-40B4-BE49-F238E27FC236}">
+                <a16:creationId xmlns:a16="http://schemas.microsoft.com/office/drawing/2014/main" id="{74AAA28D-5349-3388-A7F0-81CFAF2D6792}"/>
+              </a:ext>
+            </a:extLst>
+          </p:cNvPr>
+          <p:cNvPicPr>
+            <a:picLocks noChangeAspect="1" noChangeArrowheads="1"/>
+          </p:cNvPicPr>
+          <p:nvPr/>
+        </p:nvPicPr>
+        <p:blipFill>
+          <a:blip r:embed="rId7">
+            <a:extLst>
+              <a:ext uri="{28A0092B-C50C-407E-A947-70E740481C1C}">
+                <a14:useLocalDpi xmlns:a14="http://schemas.microsoft.com/office/drawing/2010/main" val="0"/>
+              </a:ext>
+            </a:extLst>
+          </a:blip>
+          <a:srcRect/>
+          <a:stretch>
+            <a:fillRect/>
+          </a:stretch>
+        </p:blipFill>
+        <p:spPr bwMode="auto">
+          <a:xfrm>
+            <a:off x="8230719" y="2179045"/>
+            <a:ext cx="851788" cy="851788"/>
+          </a:xfrm>
+          <a:prstGeom prst="rect">
+            <a:avLst/>
+          </a:prstGeom>
+          <a:noFill/>
+          <a:extLst>
+            <a:ext uri="{909E8E84-426E-40DD-AFC4-6F175D3DCCD1}">
+              <a14:hiddenFill xmlns:a14="http://schemas.microsoft.com/office/drawing/2010/main">
+                <a:solidFill>
+                  <a:srgbClr val="FFFFFF"/>
+                </a:solidFill>
+              </a14:hiddenFill>
+            </a:ext>
+          </a:extLst>
+        </p:spPr>
+      </p:pic>
+      <p:sp>
+        <p:nvSpPr>
+          <p:cNvPr id="22" name="Arrow: Right 21">
+            <a:extLst>
+              <a:ext uri="{FF2B5EF4-FFF2-40B4-BE49-F238E27FC236}">
+                <a16:creationId xmlns:a16="http://schemas.microsoft.com/office/drawing/2014/main" id="{5C6BCE07-A7AA-5292-1B1E-003EF4656749}"/>
+              </a:ext>
+            </a:extLst>
+          </p:cNvPr>
+          <p:cNvSpPr/>
+          <p:nvPr/>
+        </p:nvSpPr>
+        <p:spPr>
+          <a:xfrm rot="16200000">
+            <a:off x="6650898" y="3247725"/>
+            <a:ext cx="475137" cy="154004"/>
+          </a:xfrm>
+          <a:prstGeom prst="rightArrow">
+            <a:avLst/>
+          </a:prstGeom>
+        </p:spPr>
+        <p:style>
+          <a:lnRef idx="2">
+            <a:schemeClr val="accent6">
+              <a:shade val="15000"/>
+            </a:schemeClr>
+          </a:lnRef>
+          <a:fillRef idx="1">
+            <a:schemeClr val="accent6"/>
+          </a:fillRef>
+          <a:effectRef idx="0">
+            <a:schemeClr val="accent6"/>
+          </a:effectRef>
+          <a:fontRef idx="minor">
+            <a:schemeClr val="lt1"/>
+          </a:fontRef>
+        </p:style>
+        <p:txBody>
+          <a:bodyPr rtlCol="0" anchor="ctr"/>
+          <a:lstStyle/>
+          <a:p>
+            <a:pPr algn="ctr"/>
+            <a:endParaRPr lang="en-SG"/>
+          </a:p>
+        </p:txBody>
+      </p:sp>
+      <p:sp>
+        <p:nvSpPr>
+          <p:cNvPr id="23" name="Rectangle: Rounded Corners 22">
+            <a:extLst>
+              <a:ext uri="{FF2B5EF4-FFF2-40B4-BE49-F238E27FC236}">
+                <a16:creationId xmlns:a16="http://schemas.microsoft.com/office/drawing/2014/main" id="{6926A3CB-A042-77AE-4B37-7BF08AA52894}"/>
+              </a:ext>
+            </a:extLst>
+          </p:cNvPr>
+          <p:cNvSpPr/>
+          <p:nvPr/>
+        </p:nvSpPr>
+        <p:spPr>
+          <a:xfrm>
+            <a:off x="6387019" y="2369928"/>
+            <a:ext cx="1387682" cy="523220"/>
+          </a:xfrm>
+          <a:prstGeom prst="roundRect">
+            <a:avLst/>
+          </a:prstGeom>
+        </p:spPr>
+        <p:style>
+          <a:lnRef idx="2">
+            <a:schemeClr val="accent3">
+              <a:shade val="15000"/>
+            </a:schemeClr>
+          </a:lnRef>
+          <a:fillRef idx="1">
+            <a:schemeClr val="accent3"/>
+          </a:fillRef>
+          <a:effectRef idx="0">
+            <a:schemeClr val="accent3"/>
+          </a:effectRef>
+          <a:fontRef idx="minor">
+            <a:schemeClr val="lt1"/>
+          </a:fontRef>
+        </p:style>
+        <p:txBody>
+          <a:bodyPr rtlCol="0" anchor="ctr"/>
+          <a:lstStyle/>
+          <a:p>
+            <a:pPr algn="ctr"/>
+            <a:r>
+              <a:rPr lang="en-US" sz="1400" b="1" dirty="0">
+                <a:solidFill>
+                  <a:schemeClr val="bg1"/>
+                </a:solidFill>
+              </a:rPr>
+              <a:t>Volatility3</a:t>
+            </a:r>
+            <a:endParaRPr lang="en-SG" sz="1400" b="1" dirty="0">
+              <a:solidFill>
+                <a:schemeClr val="bg1"/>
+              </a:solidFill>
+            </a:endParaRPr>
+          </a:p>
+        </p:txBody>
+      </p:sp>
+      <p:sp>
+        <p:nvSpPr>
+          <p:cNvPr id="24" name="Arrow: Right 23">
+            <a:extLst>
+              <a:ext uri="{FF2B5EF4-FFF2-40B4-BE49-F238E27FC236}">
+                <a16:creationId xmlns:a16="http://schemas.microsoft.com/office/drawing/2014/main" id="{149ACE5A-93C2-6522-87F0-4C2C3B3DB9C5}"/>
+              </a:ext>
+            </a:extLst>
+          </p:cNvPr>
+          <p:cNvSpPr/>
+          <p:nvPr/>
+        </p:nvSpPr>
+        <p:spPr>
+          <a:xfrm>
+            <a:off x="7878841" y="2527272"/>
+            <a:ext cx="290172" cy="163266"/>
+          </a:xfrm>
+          <a:prstGeom prst="rightArrow">
+            <a:avLst/>
+          </a:prstGeom>
+        </p:spPr>
+        <p:style>
+          <a:lnRef idx="2">
+            <a:schemeClr val="accent6">
+              <a:shade val="15000"/>
+            </a:schemeClr>
+          </a:lnRef>
+          <a:fillRef idx="1">
+            <a:schemeClr val="accent6"/>
+          </a:fillRef>
+          <a:effectRef idx="0">
+            <a:schemeClr val="accent6"/>
+          </a:effectRef>
+          <a:fontRef idx="minor">
+            <a:schemeClr val="lt1"/>
+          </a:fontRef>
+        </p:style>
+        <p:txBody>
+          <a:bodyPr rtlCol="0" anchor="ctr"/>
+          <a:lstStyle/>
+          <a:p>
+            <a:pPr algn="ctr"/>
+            <a:endParaRPr lang="en-SG"/>
+          </a:p>
+        </p:txBody>
+      </p:sp>
+      <p:sp>
+        <p:nvSpPr>
+          <p:cNvPr id="26" name="TextBox 25">
+            <a:extLst>
+              <a:ext uri="{FF2B5EF4-FFF2-40B4-BE49-F238E27FC236}">
+                <a16:creationId xmlns:a16="http://schemas.microsoft.com/office/drawing/2014/main" id="{94F772CC-D34F-EBCF-0A96-F3DE49C1533F}"/>
+              </a:ext>
+            </a:extLst>
+          </p:cNvPr>
+          <p:cNvSpPr txBox="1"/>
+          <p:nvPr/>
+        </p:nvSpPr>
+        <p:spPr>
+          <a:xfrm>
+            <a:off x="8388589" y="1655825"/>
+            <a:ext cx="1802065" cy="523220"/>
+          </a:xfrm>
+          <a:prstGeom prst="rect">
+            <a:avLst/>
+          </a:prstGeom>
+          <a:noFill/>
+        </p:spPr>
+        <p:txBody>
+          <a:bodyPr wrap="square" rtlCol="0">
+            <a:spAutoFit/>
+          </a:bodyPr>
+          <a:lstStyle/>
+          <a:p>
+            <a:r>
+              <a:rPr lang="en-US" sz="1400" b="1" dirty="0"/>
+              <a:t>Extracted Malware Process Data</a:t>
+            </a:r>
+            <a:endParaRPr lang="en-SG" sz="1400" b="1" dirty="0"/>
+          </a:p>
+        </p:txBody>
+      </p:sp>
+      <p:pic>
+        <p:nvPicPr>
+          <p:cNvPr id="1032" name="Picture 8" descr="Pyc File Icon - Free Download Files &amp; Folders Icons | IconScout">
+            <a:extLst>
+              <a:ext uri="{FF2B5EF4-FFF2-40B4-BE49-F238E27FC236}">
+                <a16:creationId xmlns:a16="http://schemas.microsoft.com/office/drawing/2014/main" id="{6DAC9CF4-AAC0-E692-56E4-C6475C1D2F25}"/>
+              </a:ext>
+            </a:extLst>
+          </p:cNvPr>
+          <p:cNvPicPr>
+            <a:picLocks noChangeAspect="1" noChangeArrowheads="1"/>
+          </p:cNvPicPr>
+          <p:nvPr/>
+        </p:nvPicPr>
+        <p:blipFill>
+          <a:blip r:embed="rId8">
+            <a:extLst>
+              <a:ext uri="{28A0092B-C50C-407E-A947-70E740481C1C}">
+                <a14:useLocalDpi xmlns:a14="http://schemas.microsoft.com/office/drawing/2010/main" val="0"/>
+              </a:ext>
+            </a:extLst>
+          </a:blip>
+          <a:srcRect/>
+          <a:stretch>
+            <a:fillRect/>
+          </a:stretch>
+        </p:blipFill>
+        <p:spPr bwMode="auto">
+          <a:xfrm>
+            <a:off x="9391769" y="2082754"/>
+            <a:ext cx="919733" cy="919733"/>
+          </a:xfrm>
+          <a:prstGeom prst="rect">
+            <a:avLst/>
+          </a:prstGeom>
+          <a:noFill/>
+          <a:extLst>
+            <a:ext uri="{909E8E84-426E-40DD-AFC4-6F175D3DCCD1}">
+              <a14:hiddenFill xmlns:a14="http://schemas.microsoft.com/office/drawing/2010/main">
+                <a:solidFill>
+                  <a:srgbClr val="FFFFFF"/>
+                </a:solidFill>
+              </a14:hiddenFill>
+            </a:ext>
+          </a:extLst>
+        </p:spPr>
+      </p:pic>
+      <p:sp>
+        <p:nvSpPr>
+          <p:cNvPr id="27" name="Arrow: Right 26">
+            <a:extLst>
+              <a:ext uri="{FF2B5EF4-FFF2-40B4-BE49-F238E27FC236}">
+                <a16:creationId xmlns:a16="http://schemas.microsoft.com/office/drawing/2014/main" id="{2FC2F8B6-2063-B7FA-DF4A-84026E1841E1}"/>
+              </a:ext>
+            </a:extLst>
+          </p:cNvPr>
+          <p:cNvSpPr/>
+          <p:nvPr/>
+        </p:nvSpPr>
+        <p:spPr>
+          <a:xfrm>
+            <a:off x="9158400" y="2519099"/>
+            <a:ext cx="290172" cy="163266"/>
+          </a:xfrm>
+          <a:prstGeom prst="rightArrow">
+            <a:avLst/>
+          </a:prstGeom>
+          <a:solidFill>
+            <a:srgbClr val="0070C0"/>
+          </a:solidFill>
+        </p:spPr>
+        <p:style>
+          <a:lnRef idx="2">
+            <a:schemeClr val="accent6">
+              <a:shade val="15000"/>
+            </a:schemeClr>
+          </a:lnRef>
+          <a:fillRef idx="1">
+            <a:schemeClr val="accent6"/>
+          </a:fillRef>
+          <a:effectRef idx="0">
+            <a:schemeClr val="accent6"/>
+          </a:effectRef>
+          <a:fontRef idx="minor">
+            <a:schemeClr val="lt1"/>
+          </a:fontRef>
+        </p:style>
+        <p:txBody>
+          <a:bodyPr rtlCol="0" anchor="ctr"/>
+          <a:lstStyle/>
+          <a:p>
+            <a:pPr algn="ctr"/>
+            <a:endParaRPr lang="en-SG"/>
+          </a:p>
+        </p:txBody>
+      </p:sp>
+      <p:sp>
+        <p:nvSpPr>
+          <p:cNvPr id="28" name="Arrow: Right 27">
+            <a:extLst>
+              <a:ext uri="{FF2B5EF4-FFF2-40B4-BE49-F238E27FC236}">
+                <a16:creationId xmlns:a16="http://schemas.microsoft.com/office/drawing/2014/main" id="{15DAC6FD-1AC2-4654-9E3C-7F43AF08EC41}"/>
+              </a:ext>
+            </a:extLst>
+          </p:cNvPr>
+          <p:cNvSpPr/>
+          <p:nvPr/>
+        </p:nvSpPr>
+        <p:spPr>
+          <a:xfrm rot="5400000">
+            <a:off x="9553800" y="3113162"/>
+            <a:ext cx="290172" cy="163266"/>
+          </a:xfrm>
+          <a:prstGeom prst="rightArrow">
+            <a:avLst/>
+          </a:prstGeom>
+          <a:solidFill>
+            <a:srgbClr val="0070C0"/>
+          </a:solidFill>
+        </p:spPr>
+        <p:style>
+          <a:lnRef idx="2">
+            <a:schemeClr val="accent6">
+              <a:shade val="15000"/>
+            </a:schemeClr>
+          </a:lnRef>
+          <a:fillRef idx="1">
+            <a:schemeClr val="accent6"/>
+          </a:fillRef>
+          <a:effectRef idx="0">
+            <a:schemeClr val="accent6"/>
+          </a:effectRef>
+          <a:fontRef idx="minor">
+            <a:schemeClr val="lt1"/>
+          </a:fontRef>
+        </p:style>
+        <p:txBody>
+          <a:bodyPr rtlCol="0" anchor="ctr"/>
+          <a:lstStyle/>
+          <a:p>
+            <a:pPr algn="ctr"/>
+            <a:endParaRPr lang="en-SG"/>
+          </a:p>
+        </p:txBody>
+      </p:sp>
+      <p:sp>
+        <p:nvSpPr>
+          <p:cNvPr id="29" name="Rectangle: Rounded Corners 28">
+            <a:extLst>
+              <a:ext uri="{FF2B5EF4-FFF2-40B4-BE49-F238E27FC236}">
+                <a16:creationId xmlns:a16="http://schemas.microsoft.com/office/drawing/2014/main" id="{D88F59E3-E7C1-7F95-F488-730B976B0766}"/>
+              </a:ext>
+            </a:extLst>
+          </p:cNvPr>
+          <p:cNvSpPr/>
+          <p:nvPr/>
+        </p:nvSpPr>
+        <p:spPr>
+          <a:xfrm>
+            <a:off x="8754731" y="3387103"/>
+            <a:ext cx="1387682" cy="425334"/>
+          </a:xfrm>
+          <a:prstGeom prst="roundRect">
+            <a:avLst/>
+          </a:prstGeom>
+          <a:solidFill>
+            <a:srgbClr val="0070C0"/>
+          </a:solidFill>
+        </p:spPr>
+        <p:style>
+          <a:lnRef idx="2">
+            <a:schemeClr val="accent3">
+              <a:shade val="15000"/>
+            </a:schemeClr>
+          </a:lnRef>
+          <a:fillRef idx="1">
+            <a:schemeClr val="accent3"/>
+          </a:fillRef>
+          <a:effectRef idx="0">
+            <a:schemeClr val="accent3"/>
+          </a:effectRef>
+          <a:fontRef idx="minor">
+            <a:schemeClr val="lt1"/>
+          </a:fontRef>
+        </p:style>
+        <p:txBody>
+          <a:bodyPr rtlCol="0" anchor="ctr"/>
+          <a:lstStyle/>
+          <a:p>
+            <a:pPr algn="ctr"/>
+            <a:r>
+              <a:rPr lang="en-US" sz="1400" b="1" dirty="0">
+                <a:solidFill>
+                  <a:schemeClr val="bg1"/>
+                </a:solidFill>
+              </a:rPr>
+              <a:t>uncompyle6</a:t>
+            </a:r>
+            <a:endParaRPr lang="en-SG" sz="1400" b="1" dirty="0">
+              <a:solidFill>
+                <a:schemeClr val="bg1"/>
+              </a:solidFill>
+            </a:endParaRPr>
+          </a:p>
+        </p:txBody>
+      </p:sp>
+      <p:sp>
+        <p:nvSpPr>
+          <p:cNvPr id="30" name="Arrow: Right 29">
+            <a:extLst>
+              <a:ext uri="{FF2B5EF4-FFF2-40B4-BE49-F238E27FC236}">
+                <a16:creationId xmlns:a16="http://schemas.microsoft.com/office/drawing/2014/main" id="{FC114C54-18CD-6001-18EE-07BECFBD773A}"/>
+              </a:ext>
+            </a:extLst>
+          </p:cNvPr>
+          <p:cNvSpPr/>
+          <p:nvPr/>
+        </p:nvSpPr>
+        <p:spPr>
+          <a:xfrm rot="5400000">
+            <a:off x="8927130" y="3966042"/>
+            <a:ext cx="290172" cy="163266"/>
+          </a:xfrm>
+          <a:prstGeom prst="rightArrow">
+            <a:avLst/>
+          </a:prstGeom>
+          <a:solidFill>
+            <a:srgbClr val="0070C0"/>
+          </a:solidFill>
+        </p:spPr>
+        <p:style>
+          <a:lnRef idx="2">
+            <a:schemeClr val="accent6">
+              <a:shade val="15000"/>
+            </a:schemeClr>
+          </a:lnRef>
+          <a:fillRef idx="1">
+            <a:schemeClr val="accent6"/>
+          </a:fillRef>
+          <a:effectRef idx="0">
+            <a:schemeClr val="accent6"/>
+          </a:effectRef>
+          <a:fontRef idx="minor">
+            <a:schemeClr val="lt1"/>
+          </a:fontRef>
+        </p:style>
+        <p:txBody>
+          <a:bodyPr rtlCol="0" anchor="ctr"/>
+          <a:lstStyle/>
+          <a:p>
+            <a:pPr algn="ctr"/>
+            <a:endParaRPr lang="en-SG"/>
+          </a:p>
+        </p:txBody>
+      </p:sp>
+      <p:pic>
+        <p:nvPicPr>
+          <p:cNvPr id="31" name="Picture 2">
+            <a:extLst>
+              <a:ext uri="{FF2B5EF4-FFF2-40B4-BE49-F238E27FC236}">
+                <a16:creationId xmlns:a16="http://schemas.microsoft.com/office/drawing/2014/main" id="{0CA2C599-FC7F-48EA-B66F-E6F2AE9E1753}"/>
+              </a:ext>
+            </a:extLst>
+          </p:cNvPr>
+          <p:cNvPicPr>
+            <a:picLocks noChangeAspect="1" noChangeArrowheads="1"/>
+          </p:cNvPicPr>
+          <p:nvPr/>
+        </p:nvPicPr>
+        <p:blipFill>
+          <a:blip r:embed="rId2">
+            <a:extLst>
+              <a:ext uri="{28A0092B-C50C-407E-A947-70E740481C1C}">
+                <a14:useLocalDpi xmlns:a14="http://schemas.microsoft.com/office/drawing/2010/main" val="0"/>
+              </a:ext>
+            </a:extLst>
+          </a:blip>
+          <a:srcRect/>
+          <a:stretch>
+            <a:fillRect/>
+          </a:stretch>
+        </p:blipFill>
+        <p:spPr bwMode="auto">
+          <a:xfrm>
+            <a:off x="8686122" y="4186123"/>
+            <a:ext cx="857579" cy="857579"/>
+          </a:xfrm>
+          <a:prstGeom prst="rect">
+            <a:avLst/>
+          </a:prstGeom>
+          <a:noFill/>
+          <a:extLst>
+            <a:ext uri="{909E8E84-426E-40DD-AFC4-6F175D3DCCD1}">
+              <a14:hiddenFill xmlns:a14="http://schemas.microsoft.com/office/drawing/2010/main">
+                <a:solidFill>
+                  <a:srgbClr val="FFFFFF"/>
+                </a:solidFill>
+              </a14:hiddenFill>
+            </a:ext>
+          </a:extLst>
+        </p:spPr>
+      </p:pic>
+      <p:sp>
+        <p:nvSpPr>
+          <p:cNvPr id="32" name="TextBox 31">
+            <a:extLst>
+              <a:ext uri="{FF2B5EF4-FFF2-40B4-BE49-F238E27FC236}">
+                <a16:creationId xmlns:a16="http://schemas.microsoft.com/office/drawing/2014/main" id="{DB31BB31-669B-08E5-1CA5-0D0B179EEC71}"/>
+              </a:ext>
+            </a:extLst>
+          </p:cNvPr>
+          <p:cNvSpPr txBox="1"/>
+          <p:nvPr/>
+        </p:nvSpPr>
+        <p:spPr>
+          <a:xfrm>
+            <a:off x="8567446" y="5061118"/>
+            <a:ext cx="2307893" cy="307777"/>
+          </a:xfrm>
+          <a:prstGeom prst="rect">
+            <a:avLst/>
+          </a:prstGeom>
+          <a:noFill/>
+        </p:spPr>
+        <p:txBody>
+          <a:bodyPr wrap="square" rtlCol="0">
+            <a:spAutoFit/>
+          </a:bodyPr>
+          <a:lstStyle/>
+          <a:p>
+            <a:r>
+              <a:rPr lang="en-US" sz="1400" b="1" dirty="0"/>
+              <a:t>Decompiled python code </a:t>
+            </a:r>
+            <a:endParaRPr lang="en-SG" sz="1400" b="1" dirty="0"/>
+          </a:p>
+        </p:txBody>
+      </p:sp>
+      <p:pic>
+        <p:nvPicPr>
+          <p:cNvPr id="33" name="Picture 32">
+            <a:extLst>
+              <a:ext uri="{FF2B5EF4-FFF2-40B4-BE49-F238E27FC236}">
+                <a16:creationId xmlns:a16="http://schemas.microsoft.com/office/drawing/2014/main" id="{382F5A77-9265-92F6-F497-D12B1299723E}"/>
+              </a:ext>
+            </a:extLst>
+          </p:cNvPr>
+          <p:cNvPicPr>
+            <a:picLocks noChangeAspect="1"/>
+          </p:cNvPicPr>
+          <p:nvPr/>
+        </p:nvPicPr>
+        <p:blipFill>
+          <a:blip r:embed="rId9"/>
+          <a:stretch>
+            <a:fillRect/>
+          </a:stretch>
+        </p:blipFill>
+        <p:spPr>
+          <a:xfrm>
+            <a:off x="1901157" y="3554800"/>
+            <a:ext cx="659463" cy="731145"/>
+          </a:xfrm>
+          <a:prstGeom prst="rect">
+            <a:avLst/>
+          </a:prstGeom>
+          <a:ln w="9525">
+            <a:solidFill>
+              <a:schemeClr val="tx1"/>
+            </a:solidFill>
+          </a:ln>
+        </p:spPr>
+      </p:pic>
+      <p:sp>
+        <p:nvSpPr>
+          <p:cNvPr id="34" name="TextBox 33">
+            <a:extLst>
+              <a:ext uri="{FF2B5EF4-FFF2-40B4-BE49-F238E27FC236}">
+                <a16:creationId xmlns:a16="http://schemas.microsoft.com/office/drawing/2014/main" id="{F3E64EA0-41A4-6640-5169-4BA4C4BE67B1}"/>
+              </a:ext>
+            </a:extLst>
+          </p:cNvPr>
+          <p:cNvSpPr txBox="1"/>
+          <p:nvPr/>
+        </p:nvSpPr>
+        <p:spPr>
+          <a:xfrm>
+            <a:off x="1757210" y="4377323"/>
+            <a:ext cx="1196302" cy="461665"/>
+          </a:xfrm>
+          <a:prstGeom prst="rect">
+            <a:avLst/>
+          </a:prstGeom>
+          <a:noFill/>
+        </p:spPr>
+        <p:txBody>
+          <a:bodyPr wrap="square" rtlCol="0">
+            <a:spAutoFit/>
+          </a:bodyPr>
+          <a:lstStyle/>
+          <a:p>
+            <a:r>
+              <a:rPr lang="en-US" sz="1200" b="1" dirty="0">
+                <a:solidFill>
+                  <a:srgbClr val="C00000"/>
+                </a:solidFill>
+              </a:rPr>
+              <a:t>Red Team Attacker</a:t>
+            </a:r>
+            <a:endParaRPr lang="en-SG" sz="1200" b="1" dirty="0">
+              <a:solidFill>
+                <a:srgbClr val="C00000"/>
+              </a:solidFill>
+            </a:endParaRPr>
+          </a:p>
+        </p:txBody>
+      </p:sp>
+      <p:sp>
+        <p:nvSpPr>
+          <p:cNvPr id="35" name="Arrow: Right 34">
+            <a:extLst>
+              <a:ext uri="{FF2B5EF4-FFF2-40B4-BE49-F238E27FC236}">
+                <a16:creationId xmlns:a16="http://schemas.microsoft.com/office/drawing/2014/main" id="{CCFB0A15-3F18-56B1-166F-753F06A93621}"/>
+              </a:ext>
+            </a:extLst>
+          </p:cNvPr>
+          <p:cNvSpPr/>
+          <p:nvPr/>
+        </p:nvSpPr>
+        <p:spPr>
+          <a:xfrm rot="16200000">
+            <a:off x="2031299" y="3175093"/>
+            <a:ext cx="365760" cy="154004"/>
+          </a:xfrm>
+          <a:prstGeom prst="rightArrow">
+            <a:avLst/>
+          </a:prstGeom>
+          <a:solidFill>
+            <a:srgbClr val="C00000"/>
+          </a:solidFill>
+        </p:spPr>
+        <p:style>
+          <a:lnRef idx="2">
+            <a:schemeClr val="accent1">
+              <a:shade val="15000"/>
+            </a:schemeClr>
+          </a:lnRef>
+          <a:fillRef idx="1">
+            <a:schemeClr val="accent1"/>
+          </a:fillRef>
+          <a:effectRef idx="0">
+            <a:schemeClr val="accent1"/>
+          </a:effectRef>
+          <a:fontRef idx="minor">
+            <a:schemeClr val="lt1"/>
+          </a:fontRef>
+        </p:style>
+        <p:txBody>
+          <a:bodyPr rtlCol="0" anchor="ctr"/>
+          <a:lstStyle/>
+          <a:p>
+            <a:pPr algn="ctr"/>
+            <a:endParaRPr lang="en-SG"/>
+          </a:p>
+        </p:txBody>
+      </p:sp>
+      <p:pic>
+        <p:nvPicPr>
+          <p:cNvPr id="37" name="Picture 36">
+            <a:extLst>
+              <a:ext uri="{FF2B5EF4-FFF2-40B4-BE49-F238E27FC236}">
+                <a16:creationId xmlns:a16="http://schemas.microsoft.com/office/drawing/2014/main" id="{9A9A9C3A-83C7-B32F-35E8-0D82EDB4230E}"/>
+              </a:ext>
+            </a:extLst>
+          </p:cNvPr>
+          <p:cNvPicPr>
+            <a:picLocks noChangeAspect="1"/>
+          </p:cNvPicPr>
+          <p:nvPr/>
+        </p:nvPicPr>
+        <p:blipFill>
+          <a:blip r:embed="rId10"/>
+          <a:stretch>
+            <a:fillRect/>
+          </a:stretch>
+        </p:blipFill>
+        <p:spPr>
+          <a:xfrm>
+            <a:off x="9855023" y="4110857"/>
+            <a:ext cx="827632" cy="857579"/>
+          </a:xfrm>
+          <a:prstGeom prst="rect">
+            <a:avLst/>
+          </a:prstGeom>
+          <a:ln w="9525">
+            <a:solidFill>
+              <a:schemeClr val="tx1"/>
+            </a:solidFill>
+          </a:ln>
+        </p:spPr>
+      </p:pic>
+      <p:sp>
+        <p:nvSpPr>
+          <p:cNvPr id="38" name="Arrow: Right 37">
+            <a:extLst>
+              <a:ext uri="{FF2B5EF4-FFF2-40B4-BE49-F238E27FC236}">
+                <a16:creationId xmlns:a16="http://schemas.microsoft.com/office/drawing/2014/main" id="{689BBF74-FEBD-33D0-D334-9793F6953B8A}"/>
+              </a:ext>
+            </a:extLst>
+          </p:cNvPr>
+          <p:cNvSpPr/>
+          <p:nvPr/>
+        </p:nvSpPr>
+        <p:spPr>
+          <a:xfrm>
+            <a:off x="9496593" y="4458013"/>
+            <a:ext cx="290172" cy="163266"/>
+          </a:xfrm>
+          <a:prstGeom prst="rightArrow">
+            <a:avLst/>
+          </a:prstGeom>
+          <a:solidFill>
+            <a:srgbClr val="0070C0"/>
+          </a:solidFill>
+        </p:spPr>
+        <p:style>
+          <a:lnRef idx="2">
+            <a:schemeClr val="accent6">
+              <a:shade val="15000"/>
+            </a:schemeClr>
+          </a:lnRef>
+          <a:fillRef idx="1">
+            <a:schemeClr val="accent6"/>
+          </a:fillRef>
+          <a:effectRef idx="0">
+            <a:schemeClr val="accent6"/>
+          </a:effectRef>
+          <a:fontRef idx="minor">
+            <a:schemeClr val="lt1"/>
+          </a:fontRef>
+        </p:style>
+        <p:txBody>
+          <a:bodyPr rtlCol="0" anchor="ctr"/>
+          <a:lstStyle/>
+          <a:p>
+            <a:pPr algn="ctr"/>
+            <a:endParaRPr lang="en-SG"/>
+          </a:p>
+        </p:txBody>
+      </p:sp>
+      <p:sp>
+        <p:nvSpPr>
+          <p:cNvPr id="39" name="TextBox 38">
+            <a:extLst>
+              <a:ext uri="{FF2B5EF4-FFF2-40B4-BE49-F238E27FC236}">
+                <a16:creationId xmlns:a16="http://schemas.microsoft.com/office/drawing/2014/main" id="{00B6F066-C514-ACB3-ABD1-36E670BB66DA}"/>
+              </a:ext>
+            </a:extLst>
+          </p:cNvPr>
+          <p:cNvSpPr txBox="1"/>
+          <p:nvPr/>
+        </p:nvSpPr>
+        <p:spPr>
+          <a:xfrm>
+            <a:off x="1792440" y="605546"/>
+            <a:ext cx="8952614" cy="707886"/>
+          </a:xfrm>
+          <a:prstGeom prst="rect">
+            <a:avLst/>
+          </a:prstGeom>
+          <a:noFill/>
+          <a:ln w="19050">
+            <a:solidFill>
+              <a:schemeClr val="tx1"/>
+            </a:solidFill>
+            <a:prstDash val="sysDash"/>
+          </a:ln>
+        </p:spPr>
+        <p:txBody>
+          <a:bodyPr wrap="square">
+            <a:spAutoFit/>
+          </a:bodyPr>
+          <a:lstStyle/>
+          <a:p>
+            <a:r>
+              <a:rPr lang="en-US" sz="2000" b="1" dirty="0"/>
+              <a:t>Reverse Engineering to Get the Python Malware Source Code via Memory Dump For Digital Forensics and Incident Response (DFIR) operations</a:t>
+            </a:r>
+            <a:endParaRPr lang="en-SG" sz="2000" b="1" dirty="0">
+              <a:solidFill>
+                <a:schemeClr val="accent6">
+                  <a:lumMod val="75000"/>
+                </a:schemeClr>
+              </a:solidFill>
+            </a:endParaRPr>
+          </a:p>
+        </p:txBody>
+      </p:sp>
+      <p:sp>
+        <p:nvSpPr>
+          <p:cNvPr id="2" name="Rectangle: Rounded Corners 1">
+            <a:extLst>
+              <a:ext uri="{FF2B5EF4-FFF2-40B4-BE49-F238E27FC236}">
+                <a16:creationId xmlns:a16="http://schemas.microsoft.com/office/drawing/2014/main" id="{84EE4025-EC84-C064-AFFE-FA13EC19AB92}"/>
+              </a:ext>
+            </a:extLst>
+          </p:cNvPr>
+          <p:cNvSpPr/>
+          <p:nvPr/>
+        </p:nvSpPr>
+        <p:spPr>
+          <a:xfrm>
+            <a:off x="1726293" y="5525064"/>
+            <a:ext cx="1291992" cy="595807"/>
+          </a:xfrm>
+          <a:prstGeom prst="roundRect">
+            <a:avLst/>
+          </a:prstGeom>
+        </p:spPr>
+        <p:style>
+          <a:lnRef idx="2">
+            <a:schemeClr val="accent1">
+              <a:shade val="15000"/>
+            </a:schemeClr>
+          </a:lnRef>
+          <a:fillRef idx="1">
+            <a:schemeClr val="accent1"/>
+          </a:fillRef>
+          <a:effectRef idx="0">
+            <a:schemeClr val="accent1"/>
+          </a:effectRef>
+          <a:fontRef idx="minor">
+            <a:schemeClr val="lt1"/>
+          </a:fontRef>
+        </p:style>
+        <p:txBody>
+          <a:bodyPr rtlCol="0" anchor="ctr"/>
+          <a:lstStyle/>
+          <a:p>
+            <a:pPr algn="ctr"/>
+            <a:r>
+              <a:rPr lang="en-US" sz="1400" b="1" dirty="0">
+                <a:solidFill>
+                  <a:schemeClr val="bg1"/>
+                </a:solidFill>
+              </a:rPr>
+              <a:t>Malware Creation</a:t>
+            </a:r>
+            <a:endParaRPr lang="en-SG" sz="1400" b="1" dirty="0">
+              <a:solidFill>
+                <a:schemeClr val="bg1"/>
+              </a:solidFill>
+            </a:endParaRPr>
+          </a:p>
+        </p:txBody>
+      </p:sp>
+      <p:sp>
+        <p:nvSpPr>
+          <p:cNvPr id="3" name="Rectangle: Rounded Corners 2">
+            <a:extLst>
+              <a:ext uri="{FF2B5EF4-FFF2-40B4-BE49-F238E27FC236}">
+                <a16:creationId xmlns:a16="http://schemas.microsoft.com/office/drawing/2014/main" id="{CAF933F3-99AC-2E8F-6254-08FFF9AD0A4E}"/>
+              </a:ext>
+            </a:extLst>
+          </p:cNvPr>
+          <p:cNvSpPr/>
+          <p:nvPr/>
+        </p:nvSpPr>
+        <p:spPr>
+          <a:xfrm>
+            <a:off x="3534578" y="5525064"/>
+            <a:ext cx="1365609" cy="595807"/>
+          </a:xfrm>
+          <a:prstGeom prst="roundRect">
+            <a:avLst/>
+          </a:prstGeom>
+        </p:spPr>
+        <p:style>
+          <a:lnRef idx="2">
+            <a:schemeClr val="accent4">
+              <a:shade val="15000"/>
+            </a:schemeClr>
+          </a:lnRef>
+          <a:fillRef idx="1">
+            <a:schemeClr val="accent4"/>
+          </a:fillRef>
+          <a:effectRef idx="0">
+            <a:schemeClr val="accent4"/>
+          </a:effectRef>
+          <a:fontRef idx="minor">
+            <a:schemeClr val="lt1"/>
+          </a:fontRef>
+        </p:style>
+        <p:txBody>
+          <a:bodyPr rtlCol="0" anchor="ctr"/>
+          <a:lstStyle/>
+          <a:p>
+            <a:pPr algn="ctr"/>
+            <a:r>
+              <a:rPr lang="en-US" sz="1400" b="1" dirty="0">
+                <a:solidFill>
+                  <a:schemeClr val="bg1"/>
+                </a:solidFill>
+              </a:rPr>
+              <a:t>Victim Node  Configuration</a:t>
+            </a:r>
+            <a:endParaRPr lang="en-SG" sz="1400" b="1" dirty="0">
+              <a:solidFill>
+                <a:schemeClr val="bg1"/>
+              </a:solidFill>
+            </a:endParaRPr>
+          </a:p>
+        </p:txBody>
+      </p:sp>
+      <p:sp>
+        <p:nvSpPr>
+          <p:cNvPr id="4" name="Rectangle: Rounded Corners 3">
+            <a:extLst>
+              <a:ext uri="{FF2B5EF4-FFF2-40B4-BE49-F238E27FC236}">
+                <a16:creationId xmlns:a16="http://schemas.microsoft.com/office/drawing/2014/main" id="{2C5ADBD5-43AE-31C7-CC57-A8811A2DB9C0}"/>
+              </a:ext>
+            </a:extLst>
+          </p:cNvPr>
+          <p:cNvSpPr/>
+          <p:nvPr/>
+        </p:nvSpPr>
+        <p:spPr>
+          <a:xfrm>
+            <a:off x="5454673" y="5525064"/>
+            <a:ext cx="1202159" cy="595807"/>
+          </a:xfrm>
+          <a:prstGeom prst="roundRect">
+            <a:avLst/>
+          </a:prstGeom>
+        </p:spPr>
+        <p:style>
+          <a:lnRef idx="2">
+            <a:schemeClr val="accent3">
+              <a:shade val="15000"/>
+            </a:schemeClr>
+          </a:lnRef>
+          <a:fillRef idx="1">
+            <a:schemeClr val="accent3"/>
+          </a:fillRef>
+          <a:effectRef idx="0">
+            <a:schemeClr val="accent3"/>
+          </a:effectRef>
+          <a:fontRef idx="minor">
+            <a:schemeClr val="lt1"/>
+          </a:fontRef>
+        </p:style>
+        <p:txBody>
+          <a:bodyPr rtlCol="0" anchor="ctr"/>
+          <a:lstStyle/>
+          <a:p>
+            <a:pPr algn="ctr"/>
+            <a:r>
+              <a:rPr lang="en-US" sz="1400" b="1" dirty="0">
+                <a:solidFill>
+                  <a:schemeClr val="bg1"/>
+                </a:solidFill>
+              </a:rPr>
+              <a:t>Evidence Collection</a:t>
+            </a:r>
+            <a:endParaRPr lang="en-SG" sz="1400" b="1" dirty="0">
+              <a:solidFill>
+                <a:schemeClr val="bg1"/>
+              </a:solidFill>
+            </a:endParaRPr>
+          </a:p>
+        </p:txBody>
+      </p:sp>
+      <p:sp>
+        <p:nvSpPr>
+          <p:cNvPr id="7" name="Rectangle: Rounded Corners 6">
+            <a:extLst>
+              <a:ext uri="{FF2B5EF4-FFF2-40B4-BE49-F238E27FC236}">
+                <a16:creationId xmlns:a16="http://schemas.microsoft.com/office/drawing/2014/main" id="{D9A62F8A-69EA-9B40-0512-782F888024C1}"/>
+              </a:ext>
+            </a:extLst>
+          </p:cNvPr>
+          <p:cNvSpPr/>
+          <p:nvPr/>
+        </p:nvSpPr>
+        <p:spPr>
+          <a:xfrm>
+            <a:off x="7225790" y="5525064"/>
+            <a:ext cx="1399144" cy="595807"/>
+          </a:xfrm>
+          <a:prstGeom prst="roundRect">
+            <a:avLst/>
+          </a:prstGeom>
+        </p:spPr>
+        <p:style>
+          <a:lnRef idx="2">
+            <a:schemeClr val="accent2">
+              <a:shade val="15000"/>
+            </a:schemeClr>
+          </a:lnRef>
+          <a:fillRef idx="1">
+            <a:schemeClr val="accent2"/>
+          </a:fillRef>
+          <a:effectRef idx="0">
+            <a:schemeClr val="accent2"/>
+          </a:effectRef>
+          <a:fontRef idx="minor">
+            <a:schemeClr val="lt1"/>
+          </a:fontRef>
+        </p:style>
+        <p:txBody>
+          <a:bodyPr rtlCol="0" anchor="ctr"/>
+          <a:lstStyle/>
+          <a:p>
+            <a:pPr algn="ctr"/>
+            <a:r>
+              <a:rPr lang="en-US" sz="1400" b="1" dirty="0">
+                <a:solidFill>
+                  <a:schemeClr val="bg1"/>
+                </a:solidFill>
+              </a:rPr>
+              <a:t>Data Extraction</a:t>
+            </a:r>
+            <a:endParaRPr lang="en-SG" sz="1400" b="1" dirty="0">
+              <a:solidFill>
+                <a:schemeClr val="bg1"/>
+              </a:solidFill>
+            </a:endParaRPr>
+          </a:p>
+        </p:txBody>
+      </p:sp>
+      <p:sp>
+        <p:nvSpPr>
+          <p:cNvPr id="16" name="Rectangle: Rounded Corners 15">
+            <a:extLst>
+              <a:ext uri="{FF2B5EF4-FFF2-40B4-BE49-F238E27FC236}">
+                <a16:creationId xmlns:a16="http://schemas.microsoft.com/office/drawing/2014/main" id="{686EB13D-06BC-FDF9-622B-6548537783A7}"/>
+              </a:ext>
+            </a:extLst>
+          </p:cNvPr>
+          <p:cNvSpPr/>
+          <p:nvPr/>
+        </p:nvSpPr>
+        <p:spPr>
+          <a:xfrm>
+            <a:off x="9206504" y="5491022"/>
+            <a:ext cx="1399144" cy="579057"/>
+          </a:xfrm>
+          <a:prstGeom prst="roundRect">
+            <a:avLst/>
+          </a:prstGeom>
+        </p:spPr>
+        <p:style>
+          <a:lnRef idx="2">
+            <a:schemeClr val="accent5">
+              <a:shade val="15000"/>
+            </a:schemeClr>
+          </a:lnRef>
+          <a:fillRef idx="1">
+            <a:schemeClr val="accent5"/>
+          </a:fillRef>
+          <a:effectRef idx="0">
+            <a:schemeClr val="accent5"/>
+          </a:effectRef>
+          <a:fontRef idx="minor">
+            <a:schemeClr val="lt1"/>
+          </a:fontRef>
+        </p:style>
+        <p:txBody>
+          <a:bodyPr rtlCol="0" anchor="ctr"/>
+          <a:lstStyle/>
+          <a:p>
+            <a:pPr algn="ctr"/>
+            <a:r>
+              <a:rPr lang="en-US" sz="1400" b="1" dirty="0">
+                <a:solidFill>
+                  <a:schemeClr val="bg1"/>
+                </a:solidFill>
+              </a:rPr>
+              <a:t>Reverse Engineering</a:t>
+            </a:r>
+            <a:endParaRPr lang="en-SG" sz="1400" b="1" dirty="0">
+              <a:solidFill>
+                <a:schemeClr val="bg1"/>
+              </a:solidFill>
+            </a:endParaRPr>
+          </a:p>
+        </p:txBody>
+      </p:sp>
+      <p:sp>
+        <p:nvSpPr>
+          <p:cNvPr id="36" name="Arrow: Right 35">
+            <a:extLst>
+              <a:ext uri="{FF2B5EF4-FFF2-40B4-BE49-F238E27FC236}">
+                <a16:creationId xmlns:a16="http://schemas.microsoft.com/office/drawing/2014/main" id="{64770521-8D5E-EF1B-D5F1-E5ABA91472C6}"/>
+              </a:ext>
+            </a:extLst>
+          </p:cNvPr>
+          <p:cNvSpPr/>
+          <p:nvPr/>
+        </p:nvSpPr>
+        <p:spPr>
+          <a:xfrm>
+            <a:off x="3186104" y="5757279"/>
+            <a:ext cx="290172" cy="163266"/>
+          </a:xfrm>
+          <a:prstGeom prst="rightArrow">
+            <a:avLst/>
+          </a:prstGeom>
+          <a:solidFill>
+            <a:srgbClr val="0070C0"/>
+          </a:solidFill>
+        </p:spPr>
+        <p:style>
+          <a:lnRef idx="2">
+            <a:schemeClr val="accent6">
+              <a:shade val="15000"/>
+            </a:schemeClr>
+          </a:lnRef>
+          <a:fillRef idx="1">
+            <a:schemeClr val="accent6"/>
+          </a:fillRef>
+          <a:effectRef idx="0">
+            <a:schemeClr val="accent6"/>
+          </a:effectRef>
+          <a:fontRef idx="minor">
+            <a:schemeClr val="lt1"/>
+          </a:fontRef>
+        </p:style>
+        <p:txBody>
+          <a:bodyPr rtlCol="0" anchor="ctr"/>
+          <a:lstStyle/>
+          <a:p>
+            <a:pPr algn="ctr"/>
+            <a:endParaRPr lang="en-SG"/>
+          </a:p>
+        </p:txBody>
+      </p:sp>
+      <p:sp>
+        <p:nvSpPr>
+          <p:cNvPr id="40" name="Arrow: Right 39">
+            <a:extLst>
+              <a:ext uri="{FF2B5EF4-FFF2-40B4-BE49-F238E27FC236}">
+                <a16:creationId xmlns:a16="http://schemas.microsoft.com/office/drawing/2014/main" id="{127B1E8F-FBA8-5164-049D-AFA49D2472DD}"/>
+              </a:ext>
+            </a:extLst>
+          </p:cNvPr>
+          <p:cNvSpPr/>
+          <p:nvPr/>
+        </p:nvSpPr>
+        <p:spPr>
+          <a:xfrm>
+            <a:off x="5045778" y="5764116"/>
+            <a:ext cx="290172" cy="163266"/>
+          </a:xfrm>
+          <a:prstGeom prst="rightArrow">
+            <a:avLst/>
+          </a:prstGeom>
+          <a:solidFill>
+            <a:srgbClr val="0070C0"/>
+          </a:solidFill>
+        </p:spPr>
+        <p:style>
+          <a:lnRef idx="2">
+            <a:schemeClr val="accent6">
+              <a:shade val="15000"/>
+            </a:schemeClr>
+          </a:lnRef>
+          <a:fillRef idx="1">
+            <a:schemeClr val="accent6"/>
+          </a:fillRef>
+          <a:effectRef idx="0">
+            <a:schemeClr val="accent6"/>
+          </a:effectRef>
+          <a:fontRef idx="minor">
+            <a:schemeClr val="lt1"/>
+          </a:fontRef>
+        </p:style>
+        <p:txBody>
+          <a:bodyPr rtlCol="0" anchor="ctr"/>
+          <a:lstStyle/>
+          <a:p>
+            <a:pPr algn="ctr"/>
+            <a:endParaRPr lang="en-SG"/>
+          </a:p>
+        </p:txBody>
+      </p:sp>
+      <p:sp>
+        <p:nvSpPr>
+          <p:cNvPr id="41" name="Arrow: Right 40">
+            <a:extLst>
+              <a:ext uri="{FF2B5EF4-FFF2-40B4-BE49-F238E27FC236}">
+                <a16:creationId xmlns:a16="http://schemas.microsoft.com/office/drawing/2014/main" id="{9B3D3525-D97F-0510-6ACB-BAC16039D51A}"/>
+              </a:ext>
+            </a:extLst>
+          </p:cNvPr>
+          <p:cNvSpPr/>
+          <p:nvPr/>
+        </p:nvSpPr>
+        <p:spPr>
+          <a:xfrm>
+            <a:off x="6807318" y="5748371"/>
+            <a:ext cx="290172" cy="163266"/>
+          </a:xfrm>
+          <a:prstGeom prst="rightArrow">
+            <a:avLst/>
+          </a:prstGeom>
+          <a:solidFill>
+            <a:srgbClr val="0070C0"/>
+          </a:solidFill>
+        </p:spPr>
+        <p:style>
+          <a:lnRef idx="2">
+            <a:schemeClr val="accent6">
+              <a:shade val="15000"/>
+            </a:schemeClr>
+          </a:lnRef>
+          <a:fillRef idx="1">
+            <a:schemeClr val="accent6"/>
+          </a:fillRef>
+          <a:effectRef idx="0">
+            <a:schemeClr val="accent6"/>
+          </a:effectRef>
+          <a:fontRef idx="minor">
+            <a:schemeClr val="lt1"/>
+          </a:fontRef>
+        </p:style>
+        <p:txBody>
+          <a:bodyPr rtlCol="0" anchor="ctr"/>
+          <a:lstStyle/>
+          <a:p>
+            <a:pPr algn="ctr"/>
+            <a:endParaRPr lang="en-SG"/>
+          </a:p>
+        </p:txBody>
+      </p:sp>
+      <p:sp>
+        <p:nvSpPr>
+          <p:cNvPr id="42" name="Arrow: Right 41">
+            <a:extLst>
+              <a:ext uri="{FF2B5EF4-FFF2-40B4-BE49-F238E27FC236}">
+                <a16:creationId xmlns:a16="http://schemas.microsoft.com/office/drawing/2014/main" id="{2E50E5F9-6486-1771-9926-250C5E5ADEF5}"/>
+              </a:ext>
+            </a:extLst>
+          </p:cNvPr>
+          <p:cNvSpPr/>
+          <p:nvPr/>
+        </p:nvSpPr>
+        <p:spPr>
+          <a:xfrm>
+            <a:off x="8765502" y="5695333"/>
+            <a:ext cx="290172" cy="163266"/>
+          </a:xfrm>
+          <a:prstGeom prst="rightArrow">
+            <a:avLst/>
+          </a:prstGeom>
+          <a:solidFill>
+            <a:srgbClr val="0070C0"/>
+          </a:solidFill>
+        </p:spPr>
+        <p:style>
+          <a:lnRef idx="2">
+            <a:schemeClr val="accent6">
+              <a:shade val="15000"/>
+            </a:schemeClr>
+          </a:lnRef>
+          <a:fillRef idx="1">
+            <a:schemeClr val="accent6"/>
+          </a:fillRef>
+          <a:effectRef idx="0">
+            <a:schemeClr val="accent6"/>
+          </a:effectRef>
+          <a:fontRef idx="minor">
+            <a:schemeClr val="lt1"/>
+          </a:fontRef>
+        </p:style>
+        <p:txBody>
+          <a:bodyPr rtlCol="0" anchor="ctr"/>
+          <a:lstStyle/>
+          <a:p>
+            <a:pPr algn="ctr"/>
+            <a:endParaRPr lang="en-SG"/>
+          </a:p>
+        </p:txBody>
+      </p:sp>
+    </p:spTree>
+    <p:extLst>
+      <p:ext uri="{BB962C8B-B14F-4D97-AF65-F5344CB8AC3E}">
+        <p14:creationId xmlns:p14="http://schemas.microsoft.com/office/powerpoint/2010/main" val="2461250098"/>
       </p:ext>
     </p:extLst>
   </p:cSld>

</xml_diff>